<commit_message>
RP: add A_60_950 document
</commit_message>
<xml_diff>
--- a/P(Path)/RP(ReligionPath)/ReligionPath(EN).pptx
+++ b/P(Path)/RP(ReligionPath)/ReligionPath(EN).pptx
@@ -270,7 +270,7 @@
           <a:p>
             <a:fld id="{65A9E6B4-4F33-1F4D-930F-2B9E4B7B13DD}" type="datetimeFigureOut">
               <a:rPr lang="en-DE" smtClean="0"/>
-              <a:t>15.11.23</a:t>
+              <a:t>21.11.23</a:t>
             </a:fld>
             <a:endParaRPr lang="en-DE"/>
           </a:p>
@@ -470,7 +470,7 @@
           <a:p>
             <a:fld id="{65A9E6B4-4F33-1F4D-930F-2B9E4B7B13DD}" type="datetimeFigureOut">
               <a:rPr lang="en-DE" smtClean="0"/>
-              <a:t>15.11.23</a:t>
+              <a:t>21.11.23</a:t>
             </a:fld>
             <a:endParaRPr lang="en-DE"/>
           </a:p>
@@ -680,7 +680,7 @@
           <a:p>
             <a:fld id="{65A9E6B4-4F33-1F4D-930F-2B9E4B7B13DD}" type="datetimeFigureOut">
               <a:rPr lang="en-DE" smtClean="0"/>
-              <a:t>15.11.23</a:t>
+              <a:t>21.11.23</a:t>
             </a:fld>
             <a:endParaRPr lang="en-DE"/>
           </a:p>
@@ -880,7 +880,7 @@
           <a:p>
             <a:fld id="{65A9E6B4-4F33-1F4D-930F-2B9E4B7B13DD}" type="datetimeFigureOut">
               <a:rPr lang="en-DE" smtClean="0"/>
-              <a:t>15.11.23</a:t>
+              <a:t>21.11.23</a:t>
             </a:fld>
             <a:endParaRPr lang="en-DE"/>
           </a:p>
@@ -1156,7 +1156,7 @@
           <a:p>
             <a:fld id="{65A9E6B4-4F33-1F4D-930F-2B9E4B7B13DD}" type="datetimeFigureOut">
               <a:rPr lang="en-DE" smtClean="0"/>
-              <a:t>15.11.23</a:t>
+              <a:t>21.11.23</a:t>
             </a:fld>
             <a:endParaRPr lang="en-DE"/>
           </a:p>
@@ -1424,7 +1424,7 @@
           <a:p>
             <a:fld id="{65A9E6B4-4F33-1F4D-930F-2B9E4B7B13DD}" type="datetimeFigureOut">
               <a:rPr lang="en-DE" smtClean="0"/>
-              <a:t>15.11.23</a:t>
+              <a:t>21.11.23</a:t>
             </a:fld>
             <a:endParaRPr lang="en-DE"/>
           </a:p>
@@ -1839,7 +1839,7 @@
           <a:p>
             <a:fld id="{65A9E6B4-4F33-1F4D-930F-2B9E4B7B13DD}" type="datetimeFigureOut">
               <a:rPr lang="en-DE" smtClean="0"/>
-              <a:t>15.11.23</a:t>
+              <a:t>21.11.23</a:t>
             </a:fld>
             <a:endParaRPr lang="en-DE"/>
           </a:p>
@@ -1981,7 +1981,7 @@
           <a:p>
             <a:fld id="{65A9E6B4-4F33-1F4D-930F-2B9E4B7B13DD}" type="datetimeFigureOut">
               <a:rPr lang="en-DE" smtClean="0"/>
-              <a:t>15.11.23</a:t>
+              <a:t>21.11.23</a:t>
             </a:fld>
             <a:endParaRPr lang="en-DE"/>
           </a:p>
@@ -2094,7 +2094,7 @@
           <a:p>
             <a:fld id="{65A9E6B4-4F33-1F4D-930F-2B9E4B7B13DD}" type="datetimeFigureOut">
               <a:rPr lang="en-DE" smtClean="0"/>
-              <a:t>15.11.23</a:t>
+              <a:t>21.11.23</a:t>
             </a:fld>
             <a:endParaRPr lang="en-DE"/>
           </a:p>
@@ -2407,7 +2407,7 @@
           <a:p>
             <a:fld id="{65A9E6B4-4F33-1F4D-930F-2B9E4B7B13DD}" type="datetimeFigureOut">
               <a:rPr lang="en-DE" smtClean="0"/>
-              <a:t>15.11.23</a:t>
+              <a:t>21.11.23</a:t>
             </a:fld>
             <a:endParaRPr lang="en-DE"/>
           </a:p>
@@ -2696,7 +2696,7 @@
           <a:p>
             <a:fld id="{65A9E6B4-4F33-1F4D-930F-2B9E4B7B13DD}" type="datetimeFigureOut">
               <a:rPr lang="en-DE" smtClean="0"/>
-              <a:t>15.11.23</a:t>
+              <a:t>21.11.23</a:t>
             </a:fld>
             <a:endParaRPr lang="en-DE"/>
           </a:p>
@@ -2939,7 +2939,7 @@
           <a:p>
             <a:fld id="{65A9E6B4-4F33-1F4D-930F-2B9E4B7B13DD}" type="datetimeFigureOut">
               <a:rPr lang="en-DE" smtClean="0"/>
-              <a:t>15.11.23</a:t>
+              <a:t>21.11.23</a:t>
             </a:fld>
             <a:endParaRPr lang="en-DE"/>
           </a:p>
@@ -3497,7 +3497,9 @@
         </p:nvSpPr>
         <p:spPr/>
         <p:txBody>
-          <a:bodyPr/>
+          <a:bodyPr>
+            <a:normAutofit fontScale="92500" lnSpcReduction="10000"/>
+          </a:bodyPr>
           <a:lstStyle/>
           <a:p>
             <a:pPr marL="514350" indent="-514350">
@@ -3593,6 +3595,41 @@
               </a:rPr>
               <a:t>The most spoken languages in the world: These are the Top 20</a:t>
             </a:r>
+            <a:endParaRPr lang="en-GB" b="0" i="0" dirty="0">
+              <a:solidFill>
+                <a:srgbClr val="1D1D1D"/>
+              </a:solidFill>
+              <a:effectLst/>
+              <a:latin typeface="IBM Plex Sans" panose="020F0502020204030204" pitchFamily="34" charset="0"/>
+            </a:endParaRPr>
+          </a:p>
+          <a:p>
+            <a:pPr marL="514350" indent="-514350">
+              <a:buFont typeface="+mj-lt"/>
+              <a:buAutoNum type="arabicPeriod"/>
+            </a:pPr>
+            <a:r>
+              <a:rPr lang="en-GB" dirty="0">
+                <a:solidFill>
+                  <a:srgbClr val="1D1D1D"/>
+                </a:solidFill>
+                <a:latin typeface="IBM Plex Sans" panose="020F0502020204030204" pitchFamily="34" charset="0"/>
+                <a:hlinkClick r:id="rId7"/>
+              </a:rPr>
+              <a:t>Letter dated 17 July 2006 from the Permanent Representatives of Cyprus and Malaysia to the United Nations addressed to the Secretary-General </a:t>
+            </a:r>
+            <a:endParaRPr lang="en-GB" dirty="0">
+              <a:solidFill>
+                <a:srgbClr val="1D1D1D"/>
+              </a:solidFill>
+              <a:latin typeface="IBM Plex Sans" panose="020F0502020204030204" pitchFamily="34" charset="0"/>
+            </a:endParaRPr>
+          </a:p>
+          <a:p>
+            <a:pPr marL="514350" indent="-514350">
+              <a:buFont typeface="+mj-lt"/>
+              <a:buAutoNum type="arabicPeriod"/>
+            </a:pPr>
             <a:endParaRPr lang="en-GB" b="0" i="0" dirty="0">
               <a:solidFill>
                 <a:srgbClr val="1D1D1D"/>
@@ -4512,7 +4549,7 @@
         <p:spPr/>
         <p:txBody>
           <a:bodyPr>
-            <a:normAutofit fontScale="92500" lnSpcReduction="10000"/>
+            <a:normAutofit fontScale="85000" lnSpcReduction="20000"/>
           </a:bodyPr>
           <a:lstStyle/>
           <a:p>
@@ -4649,6 +4686,21 @@
               <a:rPr lang="en-GB" dirty="0"/>
               <a:t>participate in the community</a:t>
             </a:r>
+          </a:p>
+          <a:p>
+            <a:pPr marL="514350" indent="-514350">
+              <a:buFont typeface="+mj-lt"/>
+              <a:buAutoNum type="arabicPeriod"/>
+            </a:pPr>
+            <a:r>
+              <a:rPr lang="en-GB" dirty="0"/>
+              <a:t>common ethical standards that make everyone live with happiness </a:t>
+            </a:r>
+            <a:r>
+              <a:rPr lang="en-GB"/>
+              <a:t>and dignity[6]</a:t>
+            </a:r>
+            <a:endParaRPr lang="en-GB" dirty="0"/>
           </a:p>
           <a:p>
             <a:pPr marL="514350" indent="-514350">

</xml_diff>